<commit_message>
Update HCI Project Proposal.pptx - 2
</commit_message>
<xml_diff>
--- a/Documents/HCI Project Proposal.pptx
+++ b/Documents/HCI Project Proposal.pptx
@@ -3704,12 +3704,12 @@
             <a:defRPr cap="all"/>
           </a:pPr>
           <a:r>
-            <a:rPr lang="en-US" b="1"/>
+            <a:rPr lang="en-US" b="1" dirty="0"/>
             <a:t>If it's simple</a:t>
           </a:r>
           <a:r>
-            <a:rPr lang="en-US"/>
-            <a:t>: Using JSON or INI files to store settings and task data is sufficient.</a:t>
+            <a:rPr lang="en-US" dirty="0"/>
+            <a:t>: We’ll JSON or INI files to store settings and task data.</a:t>
           </a:r>
         </a:p>
       </dgm:t>
@@ -3747,12 +3747,12 @@
             <a:defRPr cap="all"/>
           </a:pPr>
           <a:r>
-            <a:rPr lang="en-US" b="1"/>
+            <a:rPr lang="en-US" b="1" dirty="0"/>
             <a:t>If it's more complex</a:t>
           </a:r>
           <a:r>
-            <a:rPr lang="en-US"/>
-            <a:t>: Consider using SQLite for more structured and relational data storage. </a:t>
+            <a:rPr lang="en-US" dirty="0"/>
+            <a:t>: we’ll use SQLite for more structured and relational data storage. </a:t>
           </a:r>
         </a:p>
       </dgm:t>
@@ -5486,7 +5486,7 @@
         </a:bodyPr>
         <a:lstStyle/>
         <a:p>
-          <a:pPr marL="0" lvl="0" indent="0" algn="ctr" defTabSz="622300">
+          <a:pPr marL="0" lvl="0" indent="0" algn="ctr" defTabSz="666750">
             <a:lnSpc>
               <a:spcPct val="90000"/>
             </a:lnSpc>
@@ -5500,12 +5500,12 @@
             <a:defRPr cap="all"/>
           </a:pPr>
           <a:r>
-            <a:rPr lang="en-US" sz="1400" b="1" kern="1200"/>
+            <a:rPr lang="en-US" sz="1500" b="1" kern="1200" dirty="0"/>
             <a:t>If it's simple</a:t>
           </a:r>
           <a:r>
-            <a:rPr lang="en-US" sz="1400" kern="1200"/>
-            <a:t>: Using JSON or INI files to store settings and task data is sufficient.</a:t>
+            <a:rPr lang="en-US" sz="1500" kern="1200" dirty="0"/>
+            <a:t>: We’ll JSON or INI files to store settings and task data.</a:t>
           </a:r>
         </a:p>
       </dsp:txBody>
@@ -5642,7 +5642,7 @@
         </a:bodyPr>
         <a:lstStyle/>
         <a:p>
-          <a:pPr marL="0" lvl="0" indent="0" algn="ctr" defTabSz="622300">
+          <a:pPr marL="0" lvl="0" indent="0" algn="ctr" defTabSz="666750">
             <a:lnSpc>
               <a:spcPct val="90000"/>
             </a:lnSpc>
@@ -5656,12 +5656,12 @@
             <a:defRPr cap="all"/>
           </a:pPr>
           <a:r>
-            <a:rPr lang="en-US" sz="1400" b="1" kern="1200"/>
+            <a:rPr lang="en-US" sz="1500" b="1" kern="1200" dirty="0"/>
             <a:t>If it's more complex</a:t>
           </a:r>
           <a:r>
-            <a:rPr lang="en-US" sz="1400" kern="1200"/>
-            <a:t>: Consider using SQLite for more structured and relational data storage. </a:t>
+            <a:rPr lang="en-US" sz="1500" kern="1200" dirty="0"/>
+            <a:t>: we’ll use SQLite for more structured and relational data storage. </a:t>
           </a:r>
         </a:p>
       </dsp:txBody>
@@ -13483,7 +13483,7 @@
           <a:effectLst/>
           <a:extLst>
             <a:ext uri="{91240B29-F687-4f45-9708-019B960494DF}">
-              <a14:hiddenLine xmlns="" xmlns:a14="http://schemas.microsoft.com/office/drawing/2010/main" w="9525">
+              <a14:hiddenLine xmlns:a14="http://schemas.microsoft.com/office/drawing/2010/main" xmlns="" w="9525">
                 <a:solidFill>
                   <a:srgbClr val="000000"/>
                 </a:solidFill>
@@ -15005,7 +15005,7 @@
           <a:ln/>
           <a:extLst>
             <a:ext uri="{91240B29-F687-4f45-9708-019B960494DF}">
-              <a14:hiddenLine xmlns="" xmlns:a14="http://schemas.microsoft.com/office/drawing/2010/main" w="9525">
+              <a14:hiddenLine xmlns:a14="http://schemas.microsoft.com/office/drawing/2010/main" xmlns="" w="9525">
                 <a:solidFill>
                   <a:srgbClr val="000000"/>
                 </a:solidFill>
@@ -15280,7 +15280,7 @@
           <a:ln/>
           <a:extLst>
             <a:ext uri="{91240B29-F687-4f45-9708-019B960494DF}">
-              <a14:hiddenLine xmlns="" xmlns:a14="http://schemas.microsoft.com/office/drawing/2010/main" w="9525">
+              <a14:hiddenLine xmlns:a14="http://schemas.microsoft.com/office/drawing/2010/main" xmlns="" w="9525">
                 <a:solidFill>
                   <a:srgbClr val="000000"/>
                 </a:solidFill>
@@ -15563,7 +15563,7 @@
           <a:ln/>
           <a:extLst>
             <a:ext uri="{91240B29-F687-4f45-9708-019B960494DF}">
-              <a14:hiddenLine xmlns="" xmlns:a14="http://schemas.microsoft.com/office/drawing/2010/main" w="9525">
+              <a14:hiddenLine xmlns:a14="http://schemas.microsoft.com/office/drawing/2010/main" xmlns="" w="9525">
                 <a:solidFill>
                   <a:srgbClr val="000000"/>
                 </a:solidFill>
@@ -16189,7 +16189,7 @@
           <a:ln/>
           <a:extLst>
             <a:ext uri="{91240B29-F687-4f45-9708-019B960494DF}">
-              <a14:hiddenLine xmlns="" xmlns:a14="http://schemas.microsoft.com/office/drawing/2010/main" w="9525">
+              <a14:hiddenLine xmlns:a14="http://schemas.microsoft.com/office/drawing/2010/main" xmlns="" w="9525">
                 <a:solidFill>
                   <a:srgbClr val="000000"/>
                 </a:solidFill>
@@ -16528,7 +16528,7 @@
           <a:ln/>
           <a:extLst>
             <a:ext uri="{91240B29-F687-4f45-9708-019B960494DF}">
-              <a14:hiddenLine xmlns="" xmlns:a14="http://schemas.microsoft.com/office/drawing/2010/main" w="9525">
+              <a14:hiddenLine xmlns:a14="http://schemas.microsoft.com/office/drawing/2010/main" xmlns="" w="9525">
                 <a:solidFill>
                   <a:srgbClr val="000000"/>
                 </a:solidFill>
@@ -17005,7 +17005,7 @@
           <a:ln/>
           <a:extLst>
             <a:ext uri="{91240B29-F687-4f45-9708-019B960494DF}">
-              <a14:hiddenLine xmlns="" xmlns:a14="http://schemas.microsoft.com/office/drawing/2010/main" w="9525">
+              <a14:hiddenLine xmlns:a14="http://schemas.microsoft.com/office/drawing/2010/main" xmlns="" w="9525">
                 <a:solidFill>
                   <a:srgbClr val="000000"/>
                 </a:solidFill>
@@ -17434,7 +17434,7 @@
           <a:ln/>
           <a:extLst>
             <a:ext uri="{91240B29-F687-4f45-9708-019B960494DF}">
-              <a14:hiddenLine xmlns="" xmlns:a14="http://schemas.microsoft.com/office/drawing/2010/main" w="9525">
+              <a14:hiddenLine xmlns:a14="http://schemas.microsoft.com/office/drawing/2010/main" xmlns="" w="9525">
                 <a:solidFill>
                   <a:srgbClr val="000000"/>
                 </a:solidFill>
@@ -18889,7 +18889,7 @@
             </a:pPr>
             <a:r>
               <a:rPr lang="en-US" dirty="0"/>
-              <a:t>[insert name here] - [insert ID here]</a:t>
+              <a:t>Badr Elsayed- 22010664</a:t>
             </a:r>
           </a:p>
           <a:p>
@@ -20691,7 +20691,7 @@
           <a:effectLst/>
           <a:extLst>
             <a:ext uri="{91240B29-F687-4f45-9708-019B960494DF}">
-              <a14:hiddenLine xmlns:a14="http://schemas.microsoft.com/office/drawing/2010/main" xmlns:p14="http://schemas.microsoft.com/office/powerpoint/2010/main" xmlns:a16="http://schemas.microsoft.com/office/drawing/2014/main" xmlns="" w="9525">
+              <a14:hiddenLine xmlns="" xmlns:a16="http://schemas.microsoft.com/office/drawing/2014/main" xmlns:p14="http://schemas.microsoft.com/office/powerpoint/2010/main" xmlns:a14="http://schemas.microsoft.com/office/drawing/2010/main" w="9525">
                 <a:solidFill>
                   <a:srgbClr val="000000"/>
                 </a:solidFill>
@@ -21778,7 +21778,7 @@
             <p:ph idx="1"/>
             <p:extLst>
               <p:ext uri="{D42A27DB-BD31-4B8C-83A1-F6EECF244321}">
-                <p14:modId xmlns:p14="http://schemas.microsoft.com/office/powerpoint/2010/main" val="2583326091"/>
+                <p14:modId xmlns:p14="http://schemas.microsoft.com/office/powerpoint/2010/main" val="1764825795"/>
               </p:ext>
             </p:extLst>
           </p:nvPr>
@@ -21928,7 +21928,7 @@
           <a:ln/>
           <a:extLst>
             <a:ext uri="{91240B29-F687-4f45-9708-019B960494DF}">
-              <a14:hiddenLine xmlns:a16="http://schemas.microsoft.com/office/drawing/2014/main" xmlns:a14="http://schemas.microsoft.com/office/drawing/2010/main" xmlns="" w="9525">
+              <a14:hiddenLine xmlns="" xmlns:a14="http://schemas.microsoft.com/office/drawing/2010/main" xmlns:a16="http://schemas.microsoft.com/office/drawing/2014/main" w="9525">
                 <a:solidFill>
                   <a:srgbClr val="000000"/>
                 </a:solidFill>

</xml_diff>

<commit_message>
change the font and the study techniques
</commit_message>
<xml_diff>
--- a/Documents/HCI Project Proposal.pptx
+++ b/Documents/HCI Project Proposal.pptx
@@ -3747,12 +3747,12 @@
             <a:defRPr cap="all"/>
           </a:pPr>
           <a:r>
-            <a:rPr lang="en-US" b="1"/>
+            <a:rPr lang="en-US" b="1" dirty="0"/>
             <a:t>If it's more complex</a:t>
           </a:r>
           <a:r>
-            <a:rPr lang="en-US"/>
-            <a:t>: Consider using SQLite for more structured and relational data storage. </a:t>
+            <a:rPr lang="en-US" dirty="0"/>
+            <a:t>: using SQLite for more structured and relational data storage. </a:t>
           </a:r>
         </a:p>
       </dgm:t>
@@ -3948,7 +3948,7 @@
       </dgm:t>
     </dgm:pt>
     <dgm:pt modelId="{E9B9210A-CAF0-4AD1-8D18-AEDD716DC509}">
-      <dgm:prSet/>
+      <dgm:prSet custT="1"/>
       <dgm:spPr/>
       <dgm:t>
         <a:bodyPr/>
@@ -3960,8 +3960,8 @@
             </a:lnSpc>
           </a:pPr>
           <a:r>
-            <a:rPr lang="en-US"/>
-            <a:t>Create new tasks with titles and descriptions.</a:t>
+            <a:rPr lang="en-US" sz="1600" dirty="0"/>
+            <a:t>Create new tasks with titles and descriptions</a:t>
           </a:r>
         </a:p>
       </dgm:t>
@@ -3989,7 +3989,7 @@
       </dgm:t>
     </dgm:pt>
     <dgm:pt modelId="{5F8FFDD0-9E88-4448-8787-5508D6FFEDB1}">
-      <dgm:prSet/>
+      <dgm:prSet custT="1"/>
       <dgm:spPr/>
       <dgm:t>
         <a:bodyPr/>
@@ -4001,9 +4001,10 @@
             </a:lnSpc>
           </a:pPr>
           <a:r>
-            <a:rPr lang="en-US"/>
-            <a:t>Edit existing tasks.</a:t>
+            <a:rPr lang="en-US" sz="1600" dirty="0"/>
+            <a:t>Edit existing tasks</a:t>
           </a:r>
+          <a:endParaRPr lang="en-US" sz="1500" dirty="0"/>
         </a:p>
       </dgm:t>
     </dgm:pt>
@@ -4030,7 +4031,7 @@
       </dgm:t>
     </dgm:pt>
     <dgm:pt modelId="{79BB3CA5-6452-44E2-801E-01DD176963B6}">
-      <dgm:prSet/>
+      <dgm:prSet custT="1"/>
       <dgm:spPr/>
       <dgm:t>
         <a:bodyPr/>
@@ -4042,8 +4043,8 @@
             </a:lnSpc>
           </a:pPr>
           <a:r>
-            <a:rPr lang="en-US"/>
-            <a:t>Delete tasks.</a:t>
+            <a:rPr lang="en-US" sz="1600" dirty="0"/>
+            <a:t>Delete tasks</a:t>
           </a:r>
         </a:p>
       </dgm:t>
@@ -4071,7 +4072,7 @@
       </dgm:t>
     </dgm:pt>
     <dgm:pt modelId="{55E42649-3F2A-4183-859C-39D6C57D2F91}">
-      <dgm:prSet/>
+      <dgm:prSet custT="1"/>
       <dgm:spPr/>
       <dgm:t>
         <a:bodyPr/>
@@ -4083,8 +4084,8 @@
             </a:lnSpc>
           </a:pPr>
           <a:r>
-            <a:rPr lang="en-US"/>
-            <a:t>Mark tasks as completed or pending.</a:t>
+            <a:rPr lang="en-US" sz="1600" dirty="0"/>
+            <a:t>Mark tasks as completed or pending</a:t>
           </a:r>
         </a:p>
       </dgm:t>
@@ -4112,7 +4113,7 @@
       </dgm:t>
     </dgm:pt>
     <dgm:pt modelId="{4BE39EE8-0B7D-46C7-AEB5-0EA2A86AA25E}">
-      <dgm:prSet/>
+      <dgm:prSet custT="1"/>
       <dgm:spPr/>
       <dgm:t>
         <a:bodyPr/>
@@ -4124,8 +4125,8 @@
             </a:lnSpc>
           </a:pPr>
           <a:r>
-            <a:rPr lang="en-US"/>
-            <a:t>Set priorities (high, medium, low).</a:t>
+            <a:rPr lang="en-US" sz="1600" dirty="0"/>
+            <a:t>Set priorities (high, medium, low)</a:t>
           </a:r>
         </a:p>
       </dgm:t>
@@ -4686,7 +4687,7 @@
       </dgm:t>
     </dgm:pt>
     <dgm:pt modelId="{082C15E8-E597-4424-A782-8832850DB8D2}">
-      <dgm:prSet/>
+      <dgm:prSet custT="1"/>
       <dgm:spPr/>
       <dgm:t>
         <a:bodyPr/>
@@ -4699,10 +4700,10 @@
             <a:defRPr b="1"/>
           </a:pPr>
           <a:r>
-            <a:rPr lang="en-US" b="1"/>
+            <a:rPr lang="en-US" sz="1900" b="1" dirty="0"/>
             <a:t>Customizable Themes:</a:t>
           </a:r>
-          <a:endParaRPr lang="en-US"/>
+          <a:endParaRPr lang="en-US" sz="1900" dirty="0"/>
         </a:p>
       </dgm:t>
     </dgm:pt>
@@ -4729,7 +4730,7 @@
       </dgm:t>
     </dgm:pt>
     <dgm:pt modelId="{5D68C43B-D725-455F-9409-EFC3F7B701FA}">
-      <dgm:prSet/>
+      <dgm:prSet custT="1"/>
       <dgm:spPr/>
       <dgm:t>
         <a:bodyPr/>
@@ -4741,7 +4742,7 @@
             </a:lnSpc>
           </a:pPr>
           <a:r>
-            <a:rPr lang="en-US"/>
+            <a:rPr lang="en-US" sz="1600" dirty="0"/>
             <a:t>Light and dark modes.</a:t>
           </a:r>
         </a:p>
@@ -4770,7 +4771,7 @@
       </dgm:t>
     </dgm:pt>
     <dgm:pt modelId="{DC62AB87-0678-46F7-AFE3-587DF4B7480F}">
-      <dgm:prSet/>
+      <dgm:prSet custT="1"/>
       <dgm:spPr/>
       <dgm:t>
         <a:bodyPr/>
@@ -4782,8 +4783,8 @@
             </a:lnSpc>
           </a:pPr>
           <a:r>
-            <a:rPr lang="en-US"/>
-            <a:t>Option to change color schemes.</a:t>
+            <a:rPr lang="en-US" sz="1600" dirty="0"/>
+            <a:t>Option to change color schemes</a:t>
           </a:r>
         </a:p>
       </dgm:t>
@@ -4811,7 +4812,7 @@
       </dgm:t>
     </dgm:pt>
     <dgm:pt modelId="{F1747D42-40CA-4600-9367-9C9751BFBF7D}">
-      <dgm:prSet/>
+      <dgm:prSet custT="1"/>
       <dgm:spPr/>
       <dgm:t>
         <a:bodyPr/>
@@ -4824,10 +4825,10 @@
             <a:defRPr b="1"/>
           </a:pPr>
           <a:r>
-            <a:rPr lang="en-US" b="1"/>
+            <a:rPr lang="en-US" sz="1900" b="1" dirty="0"/>
             <a:t>Drag and Drop:</a:t>
           </a:r>
-          <a:endParaRPr lang="en-US"/>
+          <a:endParaRPr lang="en-US" sz="1900" dirty="0"/>
         </a:p>
       </dgm:t>
     </dgm:pt>
@@ -4854,7 +4855,7 @@
       </dgm:t>
     </dgm:pt>
     <dgm:pt modelId="{E459B3D5-9A3C-4DA4-AC1C-EF0A1EFAAF05}">
-      <dgm:prSet/>
+      <dgm:prSet custT="1"/>
       <dgm:spPr/>
       <dgm:t>
         <a:bodyPr/>
@@ -4866,8 +4867,8 @@
             </a:lnSpc>
           </a:pPr>
           <a:r>
-            <a:rPr lang="en-US"/>
-            <a:t>Reorder tasks using drag and drop.</a:t>
+            <a:rPr lang="en-US" sz="1600" dirty="0"/>
+            <a:t>Reorder tasks using drag and drop</a:t>
           </a:r>
         </a:p>
       </dgm:t>
@@ -4908,10 +4909,10 @@
             <a:defRPr b="1"/>
           </a:pPr>
           <a:r>
-            <a:rPr lang="en-US" b="1"/>
+            <a:rPr lang="en-US" b="1" dirty="0"/>
             <a:t>Responsive Design:</a:t>
           </a:r>
-          <a:endParaRPr lang="en-US"/>
+          <a:endParaRPr lang="en-US" dirty="0"/>
         </a:p>
       </dgm:t>
     </dgm:pt>
@@ -4938,7 +4939,7 @@
       </dgm:t>
     </dgm:pt>
     <dgm:pt modelId="{7D89D406-C8CA-4378-AA86-FCE8EEB52241}">
-      <dgm:prSet/>
+      <dgm:prSet custT="1"/>
       <dgm:spPr/>
       <dgm:t>
         <a:bodyPr/>
@@ -4950,8 +4951,8 @@
             </a:lnSpc>
           </a:pPr>
           <a:r>
-            <a:rPr lang="en-US"/>
-            <a:t>Ensure the UI adapts to different screen sizes.</a:t>
+            <a:rPr lang="en-US" sz="1600" dirty="0"/>
+            <a:t>Ensure the UI adapts to different screen sizes</a:t>
           </a:r>
         </a:p>
       </dgm:t>
@@ -4992,10 +4993,10 @@
             <a:defRPr b="1"/>
           </a:pPr>
           <a:r>
-            <a:rPr lang="en-US" b="1"/>
+            <a:rPr lang="en-US" b="1" dirty="0"/>
             <a:t>Context Menus:</a:t>
           </a:r>
-          <a:endParaRPr lang="en-US"/>
+          <a:endParaRPr lang="en-US" dirty="0"/>
         </a:p>
       </dgm:t>
     </dgm:pt>
@@ -5022,7 +5023,7 @@
       </dgm:t>
     </dgm:pt>
     <dgm:pt modelId="{89CEF2A3-0029-4891-BE7F-1BC1F6A4A256}">
-      <dgm:prSet/>
+      <dgm:prSet custT="1"/>
       <dgm:spPr/>
       <dgm:t>
         <a:bodyPr/>
@@ -5034,8 +5035,8 @@
             </a:lnSpc>
           </a:pPr>
           <a:r>
-            <a:rPr lang="en-US"/>
-            <a:t>Right-click options for quick actions (edit, delete, mark complete).</a:t>
+            <a:rPr lang="en-US" sz="1600" dirty="0"/>
+            <a:t>Right-click options for quick actions (edit, delete, mark complete)</a:t>
           </a:r>
         </a:p>
       </dgm:t>
@@ -5486,7 +5487,7 @@
         </a:bodyPr>
         <a:lstStyle/>
         <a:p>
-          <a:pPr marL="0" lvl="0" indent="0" algn="ctr" defTabSz="622300">
+          <a:pPr marL="0" lvl="0" indent="0" algn="ctr" defTabSz="666750">
             <a:lnSpc>
               <a:spcPct val="90000"/>
             </a:lnSpc>
@@ -5500,11 +5501,11 @@
             <a:defRPr cap="all"/>
           </a:pPr>
           <a:r>
-            <a:rPr lang="en-US" sz="1400" b="1" kern="1200"/>
+            <a:rPr lang="en-US" sz="1500" b="1" kern="1200"/>
             <a:t>If it's simple</a:t>
           </a:r>
           <a:r>
-            <a:rPr lang="en-US" sz="1400" kern="1200"/>
+            <a:rPr lang="en-US" sz="1500" kern="1200"/>
             <a:t>: Using JSON or INI files to store settings and task data is sufficient.</a:t>
           </a:r>
         </a:p>
@@ -5642,7 +5643,7 @@
         </a:bodyPr>
         <a:lstStyle/>
         <a:p>
-          <a:pPr marL="0" lvl="0" indent="0" algn="ctr" defTabSz="622300">
+          <a:pPr marL="0" lvl="0" indent="0" algn="ctr" defTabSz="666750">
             <a:lnSpc>
               <a:spcPct val="90000"/>
             </a:lnSpc>
@@ -5656,12 +5657,12 @@
             <a:defRPr cap="all"/>
           </a:pPr>
           <a:r>
-            <a:rPr lang="en-US" sz="1400" b="1" kern="1200"/>
+            <a:rPr lang="en-US" sz="1500" b="1" kern="1200" dirty="0"/>
             <a:t>If it's more complex</a:t>
           </a:r>
           <a:r>
-            <a:rPr lang="en-US" sz="1400" kern="1200"/>
-            <a:t>: Consider using SQLite for more structured and relational data storage. </a:t>
+            <a:rPr lang="en-US" sz="1500" kern="1200" dirty="0"/>
+            <a:t>: using SQLite for more structured and relational data storage. </a:t>
           </a:r>
         </a:p>
       </dsp:txBody>
@@ -5689,7 +5690,7 @@
       </dsp:nvSpPr>
       <dsp:spPr>
         <a:xfrm>
-          <a:off x="472140" y="491436"/>
+          <a:off x="472140" y="448721"/>
           <a:ext cx="768867" cy="768867"/>
         </a:xfrm>
         <a:prstGeom prst="rect">
@@ -5737,8 +5738,8 @@
       </dsp:nvSpPr>
       <dsp:spPr>
         <a:xfrm>
-          <a:off x="2277" y="1554483"/>
-          <a:ext cx="1708593" cy="683437"/>
+          <a:off x="2277" y="1511768"/>
+          <a:ext cx="1708593" cy="726152"/>
         </a:xfrm>
         <a:prstGeom prst="rect">
           <a:avLst/>
@@ -5767,7 +5768,7 @@
         </a:bodyPr>
         <a:lstStyle/>
         <a:p>
-          <a:pPr marL="0" lvl="0" indent="0" algn="ctr" defTabSz="622300">
+          <a:pPr marL="0" lvl="0" indent="0" algn="ctr" defTabSz="711200">
             <a:lnSpc>
               <a:spcPct val="100000"/>
             </a:lnSpc>
@@ -5780,14 +5781,14 @@
             <a:buNone/>
           </a:pPr>
           <a:r>
-            <a:rPr lang="en-US" sz="1400" kern="1200"/>
-            <a:t>Create new tasks with titles and descriptions.</a:t>
+            <a:rPr lang="en-US" sz="1600" kern="1200" dirty="0"/>
+            <a:t>Create new tasks with titles and descriptions</a:t>
           </a:r>
         </a:p>
       </dsp:txBody>
       <dsp:txXfrm>
-        <a:off x="2277" y="1554483"/>
-        <a:ext cx="1708593" cy="683437"/>
+        <a:off x="2277" y="1511768"/>
+        <a:ext cx="1708593" cy="726152"/>
       </dsp:txXfrm>
     </dsp:sp>
     <dsp:sp modelId="{2067CC13-4F24-4077-B090-46D09BEEE734}">
@@ -5797,7 +5798,7 @@
       </dsp:nvSpPr>
       <dsp:spPr>
         <a:xfrm>
-          <a:off x="2479738" y="491436"/>
+          <a:off x="2479738" y="448721"/>
           <a:ext cx="768867" cy="768867"/>
         </a:xfrm>
         <a:prstGeom prst="rect">
@@ -5845,8 +5846,8 @@
       </dsp:nvSpPr>
       <dsp:spPr>
         <a:xfrm>
-          <a:off x="2009875" y="1554483"/>
-          <a:ext cx="1708593" cy="683437"/>
+          <a:off x="2009875" y="1511768"/>
+          <a:ext cx="1708593" cy="726152"/>
         </a:xfrm>
         <a:prstGeom prst="rect">
           <a:avLst/>
@@ -5875,7 +5876,7 @@
         </a:bodyPr>
         <a:lstStyle/>
         <a:p>
-          <a:pPr marL="0" lvl="0" indent="0" algn="ctr" defTabSz="622300">
+          <a:pPr marL="0" lvl="0" indent="0" algn="ctr" defTabSz="711200">
             <a:lnSpc>
               <a:spcPct val="100000"/>
             </a:lnSpc>
@@ -5888,14 +5889,15 @@
             <a:buNone/>
           </a:pPr>
           <a:r>
-            <a:rPr lang="en-US" sz="1400" kern="1200"/>
-            <a:t>Edit existing tasks.</a:t>
+            <a:rPr lang="en-US" sz="1600" kern="1200" dirty="0"/>
+            <a:t>Edit existing tasks</a:t>
           </a:r>
+          <a:endParaRPr lang="en-US" sz="1500" kern="1200" dirty="0"/>
         </a:p>
       </dsp:txBody>
       <dsp:txXfrm>
-        <a:off x="2009875" y="1554483"/>
-        <a:ext cx="1708593" cy="683437"/>
+        <a:off x="2009875" y="1511768"/>
+        <a:ext cx="1708593" cy="726152"/>
       </dsp:txXfrm>
     </dsp:sp>
     <dsp:sp modelId="{3BC21FB4-9F74-451F-BF82-C15F2E2EE51C}">
@@ -5905,7 +5907,7 @@
       </dsp:nvSpPr>
       <dsp:spPr>
         <a:xfrm>
-          <a:off x="4487336" y="491436"/>
+          <a:off x="4487336" y="448721"/>
           <a:ext cx="768867" cy="768867"/>
         </a:xfrm>
         <a:prstGeom prst="rect">
@@ -5953,8 +5955,8 @@
       </dsp:nvSpPr>
       <dsp:spPr>
         <a:xfrm>
-          <a:off x="4017472" y="1554483"/>
-          <a:ext cx="1708593" cy="683437"/>
+          <a:off x="4017472" y="1511768"/>
+          <a:ext cx="1708593" cy="726152"/>
         </a:xfrm>
         <a:prstGeom prst="rect">
           <a:avLst/>
@@ -5983,7 +5985,7 @@
         </a:bodyPr>
         <a:lstStyle/>
         <a:p>
-          <a:pPr marL="0" lvl="0" indent="0" algn="ctr" defTabSz="622300">
+          <a:pPr marL="0" lvl="0" indent="0" algn="ctr" defTabSz="711200">
             <a:lnSpc>
               <a:spcPct val="100000"/>
             </a:lnSpc>
@@ -5996,14 +5998,14 @@
             <a:buNone/>
           </a:pPr>
           <a:r>
-            <a:rPr lang="en-US" sz="1400" kern="1200"/>
-            <a:t>Delete tasks.</a:t>
+            <a:rPr lang="en-US" sz="1600" kern="1200" dirty="0"/>
+            <a:t>Delete tasks</a:t>
           </a:r>
         </a:p>
       </dsp:txBody>
       <dsp:txXfrm>
-        <a:off x="4017472" y="1554483"/>
-        <a:ext cx="1708593" cy="683437"/>
+        <a:off x="4017472" y="1511768"/>
+        <a:ext cx="1708593" cy="726152"/>
       </dsp:txXfrm>
     </dsp:sp>
     <dsp:sp modelId="{AB47BAA7-261B-4328-A3B7-7BAF2D5B5047}">
@@ -6062,7 +6064,7 @@
       <dsp:spPr>
         <a:xfrm>
           <a:off x="1006076" y="3728115"/>
-          <a:ext cx="1708593" cy="683437"/>
+          <a:ext cx="1708593" cy="726152"/>
         </a:xfrm>
         <a:prstGeom prst="rect">
           <a:avLst/>
@@ -6091,7 +6093,7 @@
         </a:bodyPr>
         <a:lstStyle/>
         <a:p>
-          <a:pPr marL="0" lvl="0" indent="0" algn="ctr" defTabSz="622300">
+          <a:pPr marL="0" lvl="0" indent="0" algn="ctr" defTabSz="711200">
             <a:lnSpc>
               <a:spcPct val="100000"/>
             </a:lnSpc>
@@ -6104,14 +6106,14 @@
             <a:buNone/>
           </a:pPr>
           <a:r>
-            <a:rPr lang="en-US" sz="1400" kern="1200"/>
-            <a:t>Mark tasks as completed or pending.</a:t>
+            <a:rPr lang="en-US" sz="1600" kern="1200" dirty="0"/>
+            <a:t>Mark tasks as completed or pending</a:t>
           </a:r>
         </a:p>
       </dsp:txBody>
       <dsp:txXfrm>
         <a:off x="1006076" y="3728115"/>
-        <a:ext cx="1708593" cy="683437"/>
+        <a:ext cx="1708593" cy="726152"/>
       </dsp:txXfrm>
     </dsp:sp>
     <dsp:sp modelId="{2711F996-E4A9-4B7E-A375-3383DF6E109A}">
@@ -6170,7 +6172,7 @@
       <dsp:spPr>
         <a:xfrm>
           <a:off x="3013673" y="3728115"/>
-          <a:ext cx="1708593" cy="683437"/>
+          <a:ext cx="1708593" cy="726152"/>
         </a:xfrm>
         <a:prstGeom prst="rect">
           <a:avLst/>
@@ -6199,7 +6201,7 @@
         </a:bodyPr>
         <a:lstStyle/>
         <a:p>
-          <a:pPr marL="0" lvl="0" indent="0" algn="ctr" defTabSz="622300">
+          <a:pPr marL="0" lvl="0" indent="0" algn="ctr" defTabSz="711200">
             <a:lnSpc>
               <a:spcPct val="100000"/>
             </a:lnSpc>
@@ -6212,14 +6214,14 @@
             <a:buNone/>
           </a:pPr>
           <a:r>
-            <a:rPr lang="en-US" sz="1400" kern="1200"/>
-            <a:t>Set priorities (high, medium, low).</a:t>
+            <a:rPr lang="en-US" sz="1600" kern="1200" dirty="0"/>
+            <a:t>Set priorities (high, medium, low)</a:t>
           </a:r>
         </a:p>
       </dsp:txBody>
       <dsp:txXfrm>
         <a:off x="3013673" y="3728115"/>
-        <a:ext cx="1708593" cy="683437"/>
+        <a:ext cx="1708593" cy="726152"/>
       </dsp:txXfrm>
     </dsp:sp>
   </dsp:spTree>
@@ -6669,7 +6671,7 @@
       </dsp:nvSpPr>
       <dsp:spPr>
         <a:xfrm>
-          <a:off x="596528" y="664450"/>
+          <a:off x="596528" y="334541"/>
           <a:ext cx="815062" cy="815062"/>
         </a:xfrm>
         <a:prstGeom prst="rect">
@@ -6726,8 +6728,70 @@
       </dsp:nvSpPr>
       <dsp:spPr>
         <a:xfrm>
-          <a:off x="8053" y="1591457"/>
-          <a:ext cx="2328750" cy="349312"/>
+          <a:off x="8053" y="1289920"/>
+          <a:ext cx="2328750" cy="600380"/>
+        </a:xfrm>
+        <a:prstGeom prst="rect">
+          <a:avLst/>
+        </a:prstGeom>
+        <a:noFill/>
+        <a:ln>
+          <a:noFill/>
+        </a:ln>
+        <a:effectLst/>
+      </dsp:spPr>
+      <dsp:style>
+        <a:lnRef idx="0">
+          <a:scrgbClr r="0" g="0" b="0"/>
+        </a:lnRef>
+        <a:fillRef idx="0">
+          <a:scrgbClr r="0" g="0" b="0"/>
+        </a:fillRef>
+        <a:effectRef idx="0">
+          <a:scrgbClr r="0" g="0" b="0"/>
+        </a:effectRef>
+        <a:fontRef idx="minor"/>
+      </dsp:style>
+      <dsp:txBody>
+        <a:bodyPr spcFirstLastPara="0" vert="horz" wrap="square" lIns="0" tIns="0" rIns="0" bIns="0" numCol="1" spcCol="1270" anchor="t" anchorCtr="0">
+          <a:noAutofit/>
+        </a:bodyPr>
+        <a:lstStyle/>
+        <a:p>
+          <a:pPr marL="0" lvl="0" indent="0" algn="l" defTabSz="844550">
+            <a:lnSpc>
+              <a:spcPct val="100000"/>
+            </a:lnSpc>
+            <a:spcBef>
+              <a:spcPct val="0"/>
+            </a:spcBef>
+            <a:spcAft>
+              <a:spcPct val="35000"/>
+            </a:spcAft>
+            <a:buNone/>
+            <a:defRPr b="1"/>
+          </a:pPr>
+          <a:r>
+            <a:rPr lang="en-US" sz="1900" b="1" kern="1200" dirty="0"/>
+            <a:t>Customizable Themes:</a:t>
+          </a:r>
+          <a:endParaRPr lang="en-US" sz="1900" kern="1200" dirty="0"/>
+        </a:p>
+      </dsp:txBody>
+      <dsp:txXfrm>
+        <a:off x="8053" y="1289920"/>
+        <a:ext cx="2328750" cy="600380"/>
+      </dsp:txXfrm>
+    </dsp:sp>
+    <dsp:sp modelId="{6DEB808F-4162-4341-AB7D-7E17EAB9A621}">
+      <dsp:nvSpPr>
+        <dsp:cNvPr id="0" name=""/>
+        <dsp:cNvSpPr/>
+      </dsp:nvSpPr>
+      <dsp:spPr>
+        <a:xfrm>
+          <a:off x="8053" y="1941966"/>
+          <a:ext cx="2328750" cy="1005072"/>
         </a:xfrm>
         <a:prstGeom prst="rect">
           <a:avLst/>
@@ -6767,58 +6831,14 @@
               <a:spcPct val="35000"/>
             </a:spcAft>
             <a:buNone/>
-            <a:defRPr b="1"/>
           </a:pPr>
           <a:r>
-            <a:rPr lang="en-US" sz="1600" b="1" kern="1200"/>
-            <a:t>Customizable Themes:</a:t>
+            <a:rPr lang="en-US" sz="1600" kern="1200" dirty="0"/>
+            <a:t>Light and dark modes.</a:t>
           </a:r>
-          <a:endParaRPr lang="en-US" sz="1600" kern="1200"/>
         </a:p>
-      </dsp:txBody>
-      <dsp:txXfrm>
-        <a:off x="8053" y="1591457"/>
-        <a:ext cx="2328750" cy="349312"/>
-      </dsp:txXfrm>
-    </dsp:sp>
-    <dsp:sp modelId="{6DEB808F-4162-4341-AB7D-7E17EAB9A621}">
-      <dsp:nvSpPr>
-        <dsp:cNvPr id="0" name=""/>
-        <dsp:cNvSpPr/>
-      </dsp:nvSpPr>
-      <dsp:spPr>
-        <a:xfrm>
-          <a:off x="8053" y="1979238"/>
-          <a:ext cx="2328750" cy="637889"/>
-        </a:xfrm>
-        <a:prstGeom prst="rect">
-          <a:avLst/>
-        </a:prstGeom>
-        <a:noFill/>
-        <a:ln>
-          <a:noFill/>
-        </a:ln>
-        <a:effectLst/>
-      </dsp:spPr>
-      <dsp:style>
-        <a:lnRef idx="0">
-          <a:scrgbClr r="0" g="0" b="0"/>
-        </a:lnRef>
-        <a:fillRef idx="0">
-          <a:scrgbClr r="0" g="0" b="0"/>
-        </a:fillRef>
-        <a:effectRef idx="0">
-          <a:scrgbClr r="0" g="0" b="0"/>
-        </a:effectRef>
-        <a:fontRef idx="minor"/>
-      </dsp:style>
-      <dsp:txBody>
-        <a:bodyPr spcFirstLastPara="0" vert="horz" wrap="square" lIns="0" tIns="0" rIns="0" bIns="0" numCol="1" spcCol="1270" anchor="t" anchorCtr="0">
-          <a:noAutofit/>
-        </a:bodyPr>
-        <a:lstStyle/>
         <a:p>
-          <a:pPr marL="0" lvl="0" indent="0" algn="l" defTabSz="533400">
+          <a:pPr marL="0" lvl="0" indent="0" algn="l" defTabSz="711200">
             <a:lnSpc>
               <a:spcPct val="100000"/>
             </a:lnSpc>
@@ -6831,32 +6851,14 @@
             <a:buNone/>
           </a:pPr>
           <a:r>
-            <a:rPr lang="en-US" sz="1200" kern="1200"/>
-            <a:t>Light and dark modes.</a:t>
-          </a:r>
-        </a:p>
-        <a:p>
-          <a:pPr marL="0" lvl="0" indent="0" algn="l" defTabSz="533400">
-            <a:lnSpc>
-              <a:spcPct val="100000"/>
-            </a:lnSpc>
-            <a:spcBef>
-              <a:spcPct val="0"/>
-            </a:spcBef>
-            <a:spcAft>
-              <a:spcPct val="35000"/>
-            </a:spcAft>
-            <a:buNone/>
-          </a:pPr>
-          <a:r>
-            <a:rPr lang="en-US" sz="1200" kern="1200"/>
-            <a:t>Option to change color schemes.</a:t>
+            <a:rPr lang="en-US" sz="1600" kern="1200" dirty="0"/>
+            <a:t>Option to change color schemes</a:t>
           </a:r>
         </a:p>
       </dsp:txBody>
       <dsp:txXfrm>
-        <a:off x="8053" y="1979238"/>
-        <a:ext cx="2328750" cy="637889"/>
+        <a:off x="8053" y="1941966"/>
+        <a:ext cx="2328750" cy="1005072"/>
       </dsp:txXfrm>
     </dsp:sp>
     <dsp:sp modelId="{860EF3FD-70A0-4AAD-A517-E1D08BD18046}">
@@ -6866,7 +6868,7 @@
       </dsp:nvSpPr>
       <dsp:spPr>
         <a:xfrm>
-          <a:off x="3078933" y="664450"/>
+          <a:off x="3078933" y="334541"/>
           <a:ext cx="815062" cy="815062"/>
         </a:xfrm>
         <a:prstGeom prst="rect">
@@ -6923,8 +6925,70 @@
       </dsp:nvSpPr>
       <dsp:spPr>
         <a:xfrm>
-          <a:off x="2744334" y="1591457"/>
-          <a:ext cx="2328750" cy="349312"/>
+          <a:off x="2744334" y="1289920"/>
+          <a:ext cx="2328750" cy="600380"/>
+        </a:xfrm>
+        <a:prstGeom prst="rect">
+          <a:avLst/>
+        </a:prstGeom>
+        <a:noFill/>
+        <a:ln>
+          <a:noFill/>
+        </a:ln>
+        <a:effectLst/>
+      </dsp:spPr>
+      <dsp:style>
+        <a:lnRef idx="0">
+          <a:scrgbClr r="0" g="0" b="0"/>
+        </a:lnRef>
+        <a:fillRef idx="0">
+          <a:scrgbClr r="0" g="0" b="0"/>
+        </a:fillRef>
+        <a:effectRef idx="0">
+          <a:scrgbClr r="0" g="0" b="0"/>
+        </a:effectRef>
+        <a:fontRef idx="minor"/>
+      </dsp:style>
+      <dsp:txBody>
+        <a:bodyPr spcFirstLastPara="0" vert="horz" wrap="square" lIns="0" tIns="0" rIns="0" bIns="0" numCol="1" spcCol="1270" anchor="t" anchorCtr="0">
+          <a:noAutofit/>
+        </a:bodyPr>
+        <a:lstStyle/>
+        <a:p>
+          <a:pPr marL="0" lvl="0" indent="0" algn="l" defTabSz="844550">
+            <a:lnSpc>
+              <a:spcPct val="100000"/>
+            </a:lnSpc>
+            <a:spcBef>
+              <a:spcPct val="0"/>
+            </a:spcBef>
+            <a:spcAft>
+              <a:spcPct val="35000"/>
+            </a:spcAft>
+            <a:buNone/>
+            <a:defRPr b="1"/>
+          </a:pPr>
+          <a:r>
+            <a:rPr lang="en-US" sz="1900" b="1" kern="1200" dirty="0"/>
+            <a:t>Drag and Drop:</a:t>
+          </a:r>
+          <a:endParaRPr lang="en-US" sz="1900" kern="1200" dirty="0"/>
+        </a:p>
+      </dsp:txBody>
+      <dsp:txXfrm>
+        <a:off x="2744334" y="1289920"/>
+        <a:ext cx="2328750" cy="600380"/>
+      </dsp:txXfrm>
+    </dsp:sp>
+    <dsp:sp modelId="{EF976DAC-C790-4DBD-BE95-76784002FCEB}">
+      <dsp:nvSpPr>
+        <dsp:cNvPr id="0" name=""/>
+        <dsp:cNvSpPr/>
+      </dsp:nvSpPr>
+      <dsp:spPr>
+        <a:xfrm>
+          <a:off x="2744334" y="1941966"/>
+          <a:ext cx="2328750" cy="1005072"/>
         </a:xfrm>
         <a:prstGeom prst="rect">
           <a:avLst/>
@@ -6964,78 +7028,16 @@
               <a:spcPct val="35000"/>
             </a:spcAft>
             <a:buNone/>
-            <a:defRPr b="1"/>
           </a:pPr>
           <a:r>
-            <a:rPr lang="en-US" sz="1600" b="1" kern="1200"/>
-            <a:t>Drag and Drop:</a:t>
-          </a:r>
-          <a:endParaRPr lang="en-US" sz="1600" kern="1200"/>
-        </a:p>
-      </dsp:txBody>
-      <dsp:txXfrm>
-        <a:off x="2744334" y="1591457"/>
-        <a:ext cx="2328750" cy="349312"/>
-      </dsp:txXfrm>
-    </dsp:sp>
-    <dsp:sp modelId="{EF976DAC-C790-4DBD-BE95-76784002FCEB}">
-      <dsp:nvSpPr>
-        <dsp:cNvPr id="0" name=""/>
-        <dsp:cNvSpPr/>
-      </dsp:nvSpPr>
-      <dsp:spPr>
-        <a:xfrm>
-          <a:off x="2744334" y="1979238"/>
-          <a:ext cx="2328750" cy="637889"/>
-        </a:xfrm>
-        <a:prstGeom prst="rect">
-          <a:avLst/>
-        </a:prstGeom>
-        <a:noFill/>
-        <a:ln>
-          <a:noFill/>
-        </a:ln>
-        <a:effectLst/>
-      </dsp:spPr>
-      <dsp:style>
-        <a:lnRef idx="0">
-          <a:scrgbClr r="0" g="0" b="0"/>
-        </a:lnRef>
-        <a:fillRef idx="0">
-          <a:scrgbClr r="0" g="0" b="0"/>
-        </a:fillRef>
-        <a:effectRef idx="0">
-          <a:scrgbClr r="0" g="0" b="0"/>
-        </a:effectRef>
-        <a:fontRef idx="minor"/>
-      </dsp:style>
-      <dsp:txBody>
-        <a:bodyPr spcFirstLastPara="0" vert="horz" wrap="square" lIns="0" tIns="0" rIns="0" bIns="0" numCol="1" spcCol="1270" anchor="t" anchorCtr="0">
-          <a:noAutofit/>
-        </a:bodyPr>
-        <a:lstStyle/>
-        <a:p>
-          <a:pPr marL="0" lvl="0" indent="0" algn="l" defTabSz="533400">
-            <a:lnSpc>
-              <a:spcPct val="100000"/>
-            </a:lnSpc>
-            <a:spcBef>
-              <a:spcPct val="0"/>
-            </a:spcBef>
-            <a:spcAft>
-              <a:spcPct val="35000"/>
-            </a:spcAft>
-            <a:buNone/>
-          </a:pPr>
-          <a:r>
-            <a:rPr lang="en-US" sz="1200" kern="1200"/>
-            <a:t>Reorder tasks using drag and drop.</a:t>
+            <a:rPr lang="en-US" sz="1600" kern="1200" dirty="0"/>
+            <a:t>Reorder tasks using drag and drop</a:t>
           </a:r>
         </a:p>
       </dsp:txBody>
       <dsp:txXfrm>
-        <a:off x="2744334" y="1979238"/>
-        <a:ext cx="2328750" cy="637889"/>
+        <a:off x="2744334" y="1941966"/>
+        <a:ext cx="2328750" cy="1005072"/>
       </dsp:txXfrm>
     </dsp:sp>
     <dsp:sp modelId="{317D7814-6991-4683-912E-46111C664FB3}">
@@ -7045,7 +7047,7 @@
       </dsp:nvSpPr>
       <dsp:spPr>
         <a:xfrm>
-          <a:off x="5932021" y="664450"/>
+          <a:off x="5932021" y="334541"/>
           <a:ext cx="815062" cy="815062"/>
         </a:xfrm>
         <a:prstGeom prst="rect">
@@ -7102,8 +7104,70 @@
       </dsp:nvSpPr>
       <dsp:spPr>
         <a:xfrm>
-          <a:off x="5480615" y="1591457"/>
-          <a:ext cx="2328750" cy="349312"/>
+          <a:off x="5480615" y="1289920"/>
+          <a:ext cx="2328750" cy="600380"/>
+        </a:xfrm>
+        <a:prstGeom prst="rect">
+          <a:avLst/>
+        </a:prstGeom>
+        <a:noFill/>
+        <a:ln>
+          <a:noFill/>
+        </a:ln>
+        <a:effectLst/>
+      </dsp:spPr>
+      <dsp:style>
+        <a:lnRef idx="0">
+          <a:scrgbClr r="0" g="0" b="0"/>
+        </a:lnRef>
+        <a:fillRef idx="0">
+          <a:scrgbClr r="0" g="0" b="0"/>
+        </a:fillRef>
+        <a:effectRef idx="0">
+          <a:scrgbClr r="0" g="0" b="0"/>
+        </a:effectRef>
+        <a:fontRef idx="minor"/>
+      </dsp:style>
+      <dsp:txBody>
+        <a:bodyPr spcFirstLastPara="0" vert="horz" wrap="square" lIns="0" tIns="0" rIns="0" bIns="0" numCol="1" spcCol="1270" anchor="t" anchorCtr="0">
+          <a:noAutofit/>
+        </a:bodyPr>
+        <a:lstStyle/>
+        <a:p>
+          <a:pPr marL="0" lvl="0" indent="0" algn="l" defTabSz="844550">
+            <a:lnSpc>
+              <a:spcPct val="100000"/>
+            </a:lnSpc>
+            <a:spcBef>
+              <a:spcPct val="0"/>
+            </a:spcBef>
+            <a:spcAft>
+              <a:spcPct val="35000"/>
+            </a:spcAft>
+            <a:buNone/>
+            <a:defRPr b="1"/>
+          </a:pPr>
+          <a:r>
+            <a:rPr lang="en-US" sz="1900" b="1" kern="1200" dirty="0"/>
+            <a:t>Responsive Design:</a:t>
+          </a:r>
+          <a:endParaRPr lang="en-US" sz="1900" kern="1200" dirty="0"/>
+        </a:p>
+      </dsp:txBody>
+      <dsp:txXfrm>
+        <a:off x="5480615" y="1289920"/>
+        <a:ext cx="2328750" cy="600380"/>
+      </dsp:txXfrm>
+    </dsp:sp>
+    <dsp:sp modelId="{9283C167-461D-4133-AE68-DC0F5DA07C20}">
+      <dsp:nvSpPr>
+        <dsp:cNvPr id="0" name=""/>
+        <dsp:cNvSpPr/>
+      </dsp:nvSpPr>
+      <dsp:spPr>
+        <a:xfrm>
+          <a:off x="5480615" y="1941966"/>
+          <a:ext cx="2328750" cy="1005072"/>
         </a:xfrm>
         <a:prstGeom prst="rect">
           <a:avLst/>
@@ -7143,78 +7207,16 @@
               <a:spcPct val="35000"/>
             </a:spcAft>
             <a:buNone/>
-            <a:defRPr b="1"/>
           </a:pPr>
           <a:r>
-            <a:rPr lang="en-US" sz="1600" b="1" kern="1200"/>
-            <a:t>Responsive Design:</a:t>
-          </a:r>
-          <a:endParaRPr lang="en-US" sz="1600" kern="1200"/>
-        </a:p>
-      </dsp:txBody>
-      <dsp:txXfrm>
-        <a:off x="5480615" y="1591457"/>
-        <a:ext cx="2328750" cy="349312"/>
-      </dsp:txXfrm>
-    </dsp:sp>
-    <dsp:sp modelId="{9283C167-461D-4133-AE68-DC0F5DA07C20}">
-      <dsp:nvSpPr>
-        <dsp:cNvPr id="0" name=""/>
-        <dsp:cNvSpPr/>
-      </dsp:nvSpPr>
-      <dsp:spPr>
-        <a:xfrm>
-          <a:off x="5480615" y="1979238"/>
-          <a:ext cx="2328750" cy="637889"/>
-        </a:xfrm>
-        <a:prstGeom prst="rect">
-          <a:avLst/>
-        </a:prstGeom>
-        <a:noFill/>
-        <a:ln>
-          <a:noFill/>
-        </a:ln>
-        <a:effectLst/>
-      </dsp:spPr>
-      <dsp:style>
-        <a:lnRef idx="0">
-          <a:scrgbClr r="0" g="0" b="0"/>
-        </a:lnRef>
-        <a:fillRef idx="0">
-          <a:scrgbClr r="0" g="0" b="0"/>
-        </a:fillRef>
-        <a:effectRef idx="0">
-          <a:scrgbClr r="0" g="0" b="0"/>
-        </a:effectRef>
-        <a:fontRef idx="minor"/>
-      </dsp:style>
-      <dsp:txBody>
-        <a:bodyPr spcFirstLastPara="0" vert="horz" wrap="square" lIns="0" tIns="0" rIns="0" bIns="0" numCol="1" spcCol="1270" anchor="t" anchorCtr="0">
-          <a:noAutofit/>
-        </a:bodyPr>
-        <a:lstStyle/>
-        <a:p>
-          <a:pPr marL="0" lvl="0" indent="0" algn="l" defTabSz="533400">
-            <a:lnSpc>
-              <a:spcPct val="100000"/>
-            </a:lnSpc>
-            <a:spcBef>
-              <a:spcPct val="0"/>
-            </a:spcBef>
-            <a:spcAft>
-              <a:spcPct val="35000"/>
-            </a:spcAft>
-            <a:buNone/>
-          </a:pPr>
-          <a:r>
-            <a:rPr lang="en-US" sz="1200" kern="1200"/>
-            <a:t>Ensure the UI adapts to different screen sizes.</a:t>
+            <a:rPr lang="en-US" sz="1600" kern="1200" dirty="0"/>
+            <a:t>Ensure the UI adapts to different screen sizes</a:t>
           </a:r>
         </a:p>
       </dsp:txBody>
       <dsp:txXfrm>
-        <a:off x="5480615" y="1979238"/>
-        <a:ext cx="2328750" cy="637889"/>
+        <a:off x="5480615" y="1941966"/>
+        <a:ext cx="2328750" cy="1005072"/>
       </dsp:txXfrm>
     </dsp:sp>
     <dsp:sp modelId="{D01E8B69-7B60-4229-937F-DD9DDC8003C7}">
@@ -7224,7 +7226,7 @@
       </dsp:nvSpPr>
       <dsp:spPr>
         <a:xfrm>
-          <a:off x="8596398" y="664450"/>
+          <a:off x="8596398" y="334541"/>
           <a:ext cx="815062" cy="815062"/>
         </a:xfrm>
         <a:prstGeom prst="rect">
@@ -7281,8 +7283,70 @@
       </dsp:nvSpPr>
       <dsp:spPr>
         <a:xfrm>
-          <a:off x="8216896" y="1591457"/>
-          <a:ext cx="2328750" cy="349312"/>
+          <a:off x="8216896" y="1289920"/>
+          <a:ext cx="2328750" cy="600380"/>
+        </a:xfrm>
+        <a:prstGeom prst="rect">
+          <a:avLst/>
+        </a:prstGeom>
+        <a:noFill/>
+        <a:ln>
+          <a:noFill/>
+        </a:ln>
+        <a:effectLst/>
+      </dsp:spPr>
+      <dsp:style>
+        <a:lnRef idx="0">
+          <a:scrgbClr r="0" g="0" b="0"/>
+        </a:lnRef>
+        <a:fillRef idx="0">
+          <a:scrgbClr r="0" g="0" b="0"/>
+        </a:fillRef>
+        <a:effectRef idx="0">
+          <a:scrgbClr r="0" g="0" b="0"/>
+        </a:effectRef>
+        <a:fontRef idx="minor"/>
+      </dsp:style>
+      <dsp:txBody>
+        <a:bodyPr spcFirstLastPara="0" vert="horz" wrap="square" lIns="0" tIns="0" rIns="0" bIns="0" numCol="1" spcCol="1270" anchor="t" anchorCtr="0">
+          <a:noAutofit/>
+        </a:bodyPr>
+        <a:lstStyle/>
+        <a:p>
+          <a:pPr marL="0" lvl="0" indent="0" algn="l" defTabSz="844550">
+            <a:lnSpc>
+              <a:spcPct val="100000"/>
+            </a:lnSpc>
+            <a:spcBef>
+              <a:spcPct val="0"/>
+            </a:spcBef>
+            <a:spcAft>
+              <a:spcPct val="35000"/>
+            </a:spcAft>
+            <a:buNone/>
+            <a:defRPr b="1"/>
+          </a:pPr>
+          <a:r>
+            <a:rPr lang="en-US" sz="1900" b="1" kern="1200" dirty="0"/>
+            <a:t>Context Menus:</a:t>
+          </a:r>
+          <a:endParaRPr lang="en-US" sz="1900" kern="1200" dirty="0"/>
+        </a:p>
+      </dsp:txBody>
+      <dsp:txXfrm>
+        <a:off x="8216896" y="1289920"/>
+        <a:ext cx="2328750" cy="600380"/>
+      </dsp:txXfrm>
+    </dsp:sp>
+    <dsp:sp modelId="{567A6C12-10C1-48A0-8BDB-97F6503F78ED}">
+      <dsp:nvSpPr>
+        <dsp:cNvPr id="0" name=""/>
+        <dsp:cNvSpPr/>
+      </dsp:nvSpPr>
+      <dsp:spPr>
+        <a:xfrm>
+          <a:off x="8216896" y="1941966"/>
+          <a:ext cx="2328750" cy="1005072"/>
         </a:xfrm>
         <a:prstGeom prst="rect">
           <a:avLst/>
@@ -7322,78 +7386,16 @@
               <a:spcPct val="35000"/>
             </a:spcAft>
             <a:buNone/>
-            <a:defRPr b="1"/>
           </a:pPr>
           <a:r>
-            <a:rPr lang="en-US" sz="1600" b="1" kern="1200"/>
-            <a:t>Context Menus:</a:t>
-          </a:r>
-          <a:endParaRPr lang="en-US" sz="1600" kern="1200"/>
-        </a:p>
-      </dsp:txBody>
-      <dsp:txXfrm>
-        <a:off x="8216896" y="1591457"/>
-        <a:ext cx="2328750" cy="349312"/>
-      </dsp:txXfrm>
-    </dsp:sp>
-    <dsp:sp modelId="{567A6C12-10C1-48A0-8BDB-97F6503F78ED}">
-      <dsp:nvSpPr>
-        <dsp:cNvPr id="0" name=""/>
-        <dsp:cNvSpPr/>
-      </dsp:nvSpPr>
-      <dsp:spPr>
-        <a:xfrm>
-          <a:off x="8216896" y="1979238"/>
-          <a:ext cx="2328750" cy="637889"/>
-        </a:xfrm>
-        <a:prstGeom prst="rect">
-          <a:avLst/>
-        </a:prstGeom>
-        <a:noFill/>
-        <a:ln>
-          <a:noFill/>
-        </a:ln>
-        <a:effectLst/>
-      </dsp:spPr>
-      <dsp:style>
-        <a:lnRef idx="0">
-          <a:scrgbClr r="0" g="0" b="0"/>
-        </a:lnRef>
-        <a:fillRef idx="0">
-          <a:scrgbClr r="0" g="0" b="0"/>
-        </a:fillRef>
-        <a:effectRef idx="0">
-          <a:scrgbClr r="0" g="0" b="0"/>
-        </a:effectRef>
-        <a:fontRef idx="minor"/>
-      </dsp:style>
-      <dsp:txBody>
-        <a:bodyPr spcFirstLastPara="0" vert="horz" wrap="square" lIns="0" tIns="0" rIns="0" bIns="0" numCol="1" spcCol="1270" anchor="t" anchorCtr="0">
-          <a:noAutofit/>
-        </a:bodyPr>
-        <a:lstStyle/>
-        <a:p>
-          <a:pPr marL="0" lvl="0" indent="0" algn="l" defTabSz="533400">
-            <a:lnSpc>
-              <a:spcPct val="100000"/>
-            </a:lnSpc>
-            <a:spcBef>
-              <a:spcPct val="0"/>
-            </a:spcBef>
-            <a:spcAft>
-              <a:spcPct val="35000"/>
-            </a:spcAft>
-            <a:buNone/>
-          </a:pPr>
-          <a:r>
-            <a:rPr lang="en-US" sz="1200" kern="1200"/>
-            <a:t>Right-click options for quick actions (edit, delete, mark complete).</a:t>
+            <a:rPr lang="en-US" sz="1600" kern="1200" dirty="0"/>
+            <a:t>Right-click options for quick actions (edit, delete, mark complete)</a:t>
           </a:r>
         </a:p>
       </dsp:txBody>
       <dsp:txXfrm>
-        <a:off x="8216896" y="1979238"/>
-        <a:ext cx="2328750" cy="637889"/>
+        <a:off x="8216896" y="1941966"/>
+        <a:ext cx="2328750" cy="1005072"/>
       </dsp:txXfrm>
     </dsp:sp>
   </dsp:spTree>
@@ -13483,7 +13485,7 @@
           <a:effectLst/>
           <a:extLst>
             <a:ext uri="{91240B29-F687-4f45-9708-019B960494DF}">
-              <a14:hiddenLine xmlns="" xmlns:a14="http://schemas.microsoft.com/office/drawing/2010/main" w="9525">
+              <a14:hiddenLine xmlns:a14="http://schemas.microsoft.com/office/drawing/2010/main" xmlns="" w="9525">
                 <a:solidFill>
                   <a:srgbClr val="000000"/>
                 </a:solidFill>
@@ -15005,7 +15007,7 @@
           <a:ln/>
           <a:extLst>
             <a:ext uri="{91240B29-F687-4f45-9708-019B960494DF}">
-              <a14:hiddenLine xmlns="" xmlns:a14="http://schemas.microsoft.com/office/drawing/2010/main" w="9525">
+              <a14:hiddenLine xmlns:a14="http://schemas.microsoft.com/office/drawing/2010/main" xmlns="" w="9525">
                 <a:solidFill>
                   <a:srgbClr val="000000"/>
                 </a:solidFill>
@@ -15280,7 +15282,7 @@
           <a:ln/>
           <a:extLst>
             <a:ext uri="{91240B29-F687-4f45-9708-019B960494DF}">
-              <a14:hiddenLine xmlns="" xmlns:a14="http://schemas.microsoft.com/office/drawing/2010/main" w="9525">
+              <a14:hiddenLine xmlns:a14="http://schemas.microsoft.com/office/drawing/2010/main" xmlns="" w="9525">
                 <a:solidFill>
                   <a:srgbClr val="000000"/>
                 </a:solidFill>
@@ -15563,7 +15565,7 @@
           <a:ln/>
           <a:extLst>
             <a:ext uri="{91240B29-F687-4f45-9708-019B960494DF}">
-              <a14:hiddenLine xmlns="" xmlns:a14="http://schemas.microsoft.com/office/drawing/2010/main" w="9525">
+              <a14:hiddenLine xmlns:a14="http://schemas.microsoft.com/office/drawing/2010/main" xmlns="" w="9525">
                 <a:solidFill>
                   <a:srgbClr val="000000"/>
                 </a:solidFill>
@@ -16189,7 +16191,7 @@
           <a:ln/>
           <a:extLst>
             <a:ext uri="{91240B29-F687-4f45-9708-019B960494DF}">
-              <a14:hiddenLine xmlns="" xmlns:a14="http://schemas.microsoft.com/office/drawing/2010/main" w="9525">
+              <a14:hiddenLine xmlns:a14="http://schemas.microsoft.com/office/drawing/2010/main" xmlns="" w="9525">
                 <a:solidFill>
                   <a:srgbClr val="000000"/>
                 </a:solidFill>
@@ -16528,7 +16530,7 @@
           <a:ln/>
           <a:extLst>
             <a:ext uri="{91240B29-F687-4f45-9708-019B960494DF}">
-              <a14:hiddenLine xmlns="" xmlns:a14="http://schemas.microsoft.com/office/drawing/2010/main" w="9525">
+              <a14:hiddenLine xmlns:a14="http://schemas.microsoft.com/office/drawing/2010/main" xmlns="" w="9525">
                 <a:solidFill>
                   <a:srgbClr val="000000"/>
                 </a:solidFill>
@@ -17005,7 +17007,7 @@
           <a:ln/>
           <a:extLst>
             <a:ext uri="{91240B29-F687-4f45-9708-019B960494DF}">
-              <a14:hiddenLine xmlns="" xmlns:a14="http://schemas.microsoft.com/office/drawing/2010/main" w="9525">
+              <a14:hiddenLine xmlns:a14="http://schemas.microsoft.com/office/drawing/2010/main" xmlns="" w="9525">
                 <a:solidFill>
                   <a:srgbClr val="000000"/>
                 </a:solidFill>
@@ -17434,7 +17436,7 @@
           <a:ln/>
           <a:extLst>
             <a:ext uri="{91240B29-F687-4f45-9708-019B960494DF}">
-              <a14:hiddenLine xmlns="" xmlns:a14="http://schemas.microsoft.com/office/drawing/2010/main" w="9525">
+              <a14:hiddenLine xmlns:a14="http://schemas.microsoft.com/office/drawing/2010/main" xmlns="" w="9525">
                 <a:solidFill>
                   <a:srgbClr val="000000"/>
                 </a:solidFill>
@@ -18902,7 +18904,7 @@
             </a:pPr>
             <a:r>
               <a:rPr lang="en-US" dirty="0"/>
-              <a:t>[insert name here] - [insert ID here]</a:t>
+              <a:t>Mohamed Mostafa Sayed - 22011170</a:t>
             </a:r>
           </a:p>
           <a:p>
@@ -19991,7 +19993,7 @@
               </a:spcBef>
             </a:pPr>
             <a:r>
-              <a:rPr lang="en-US" sz="4000" kern="1200" cap="all" dirty="0">
+              <a:rPr lang="en-US" sz="4400" kern="1200" cap="all" dirty="0">
                 <a:latin typeface="+mj-lt"/>
                 <a:ea typeface="+mj-ea"/>
                 <a:cs typeface="+mj-cs"/>
@@ -20055,7 +20057,7 @@
               </a:tabLst>
             </a:pPr>
             <a:r>
-              <a:rPr lang="en-US" kern="100" dirty="0">
+              <a:rPr lang="en-US" sz="2400" kern="100" dirty="0">
                 <a:latin typeface="Liberation Serif"/>
                 <a:ea typeface="NSimSun" panose="02010609030101010101" pitchFamily="49" charset="-122"/>
               </a:rPr>
@@ -20370,7 +20372,7 @@
               </a:spcBef>
             </a:pPr>
             <a:r>
-              <a:rPr lang="en-US" sz="3600" kern="1200" cap="all" dirty="0">
+              <a:rPr lang="en-US" sz="4400" kern="1200" cap="all" dirty="0">
                 <a:latin typeface="+mj-lt"/>
                 <a:ea typeface="+mj-ea"/>
                 <a:cs typeface="+mj-cs"/>
@@ -20435,7 +20437,7 @@
               </a:tabLst>
             </a:pPr>
             <a:r>
-              <a:rPr lang="en-US" kern="100" dirty="0">
+              <a:rPr lang="en-US" sz="2400" kern="100" dirty="0">
                 <a:latin typeface="Liberation Serif"/>
                 <a:ea typeface="NSimSun" panose="02010609030101010101" pitchFamily="49" charset="-122"/>
               </a:rPr>
@@ -20517,10 +20519,10 @@
           <a:lstStyle/>
           <a:p>
             <a:r>
-              <a:rPr lang="en-US" b="1"/>
+              <a:rPr lang="en-US" sz="4400" b="1" dirty="0"/>
               <a:t>User Interface Features</a:t>
             </a:r>
-            <a:endParaRPr lang="en-US"/>
+            <a:endParaRPr lang="en-US" sz="4400" dirty="0"/>
           </a:p>
         </p:txBody>
       </p:sp>
@@ -20540,7 +20542,7 @@
             <p:ph idx="1"/>
             <p:extLst>
               <p:ext uri="{D42A27DB-BD31-4B8C-83A1-F6EECF244321}">
-                <p14:modId xmlns:p14="http://schemas.microsoft.com/office/powerpoint/2010/main" val="1415385804"/>
+                <p14:modId xmlns:p14="http://schemas.microsoft.com/office/powerpoint/2010/main" val="4104497355"/>
               </p:ext>
             </p:extLst>
           </p:nvPr>
@@ -20691,7 +20693,7 @@
           <a:effectLst/>
           <a:extLst>
             <a:ext uri="{91240B29-F687-4f45-9708-019B960494DF}">
-              <a14:hiddenLine xmlns:a14="http://schemas.microsoft.com/office/drawing/2010/main" xmlns:p14="http://schemas.microsoft.com/office/powerpoint/2010/main" xmlns:a16="http://schemas.microsoft.com/office/drawing/2014/main" xmlns="" w="9525">
+              <a14:hiddenLine xmlns="" xmlns:a16="http://schemas.microsoft.com/office/drawing/2014/main" xmlns:p14="http://schemas.microsoft.com/office/powerpoint/2010/main" xmlns:a14="http://schemas.microsoft.com/office/drawing/2010/main" w="9525">
                 <a:solidFill>
                   <a:srgbClr val="000000"/>
                 </a:solidFill>
@@ -21254,11 +21256,11 @@
           <a:lstStyle/>
           <a:p>
             <a:r>
-              <a:rPr lang="en-US"/>
+              <a:rPr lang="en-US" sz="4400" dirty="0"/>
               <a:t>O</a:t>
             </a:r>
             <a:r>
-              <a:rPr lang="en-US" b="1"/>
+              <a:rPr lang="en-US" sz="4400" b="1" dirty="0"/>
               <a:t>bjectives</a:t>
             </a:r>
           </a:p>
@@ -21288,7 +21290,7 @@
         </p:spPr>
         <p:txBody>
           <a:bodyPr>
-            <a:normAutofit/>
+            <a:normAutofit lnSpcReduction="10000"/>
           </a:bodyPr>
           <a:lstStyle/>
           <a:p>
@@ -21296,15 +21298,15 @@
               <a:buNone/>
             </a:pPr>
             <a:r>
-              <a:rPr lang="en-US" b="1" dirty="0"/>
+              <a:rPr lang="en-US" sz="2000" b="1" dirty="0"/>
               <a:t>Using Python-</a:t>
             </a:r>
             <a:r>
-              <a:rPr lang="en-US" b="1" dirty="0" err="1"/>
+              <a:rPr lang="en-US" sz="2000" b="1" dirty="0" err="1"/>
               <a:t>PyQt</a:t>
             </a:r>
             <a:r>
-              <a:rPr lang="en-US" b="1" dirty="0"/>
+              <a:rPr lang="en-US" sz="2000" b="1" dirty="0"/>
               <a:t>,</a:t>
             </a:r>
           </a:p>
@@ -21313,29 +21315,29 @@
               <a:buNone/>
             </a:pPr>
             <a:r>
-              <a:rPr lang="en-US" b="1" dirty="0"/>
+              <a:rPr lang="en-US" sz="2000" b="1" dirty="0"/>
               <a:t>An application that helps users: </a:t>
             </a:r>
           </a:p>
           <a:p>
             <a:pPr lvl="2"/>
             <a:r>
-              <a:rPr lang="en-US" dirty="0">
+              <a:rPr lang="en-US" sz="1600" dirty="0">
                 <a:latin typeface="Liberation Serif"/>
               </a:rPr>
-              <a:t>Manage their time efficiently using Pomodoro Technique.</a:t>
+              <a:t>Manage their time efficiently using varies study Techniques.</a:t>
             </a:r>
           </a:p>
           <a:p>
             <a:pPr lvl="2"/>
             <a:r>
-              <a:rPr lang="en-US" dirty="0">
+              <a:rPr lang="en-US" sz="1600" dirty="0">
                 <a:latin typeface="Liberation Serif"/>
               </a:rPr>
               <a:t>Organize their tasks and categorize them </a:t>
             </a:r>
             <a:r>
-              <a:rPr lang="en-US" kern="100" dirty="0">
+              <a:rPr lang="en-US" sz="1600" kern="100" dirty="0">
                 <a:effectLst/>
                 <a:latin typeface="Liberation Serif"/>
                 <a:ea typeface="NSimSun" panose="02010609030101010101" pitchFamily="49" charset="-122"/>
@@ -21347,7 +21349,7 @@
           <a:p>
             <a:pPr lvl="2"/>
             <a:r>
-              <a:rPr lang="en-US" kern="100" dirty="0">
+              <a:rPr lang="en-US" sz="1600" kern="100" dirty="0">
                 <a:effectLst/>
                 <a:latin typeface="Liberation Serif"/>
                 <a:ea typeface="NSimSun" panose="02010609030101010101" pitchFamily="49" charset="-122"/>
@@ -21359,7 +21361,7 @@
           <a:p>
             <a:pPr lvl="2"/>
             <a:r>
-              <a:rPr lang="en-US" kern="100" dirty="0">
+              <a:rPr lang="en-US" sz="1600" kern="100" dirty="0">
                 <a:effectLst/>
                 <a:latin typeface="Liberation Serif"/>
                 <a:ea typeface="NSimSun" panose="02010609030101010101" pitchFamily="49" charset="-122"/>
@@ -21371,7 +21373,7 @@
           <a:p>
             <a:pPr lvl="2"/>
             <a:r>
-              <a:rPr lang="en-US" kern="100" dirty="0">
+              <a:rPr lang="en-US" sz="1600" kern="100" dirty="0">
                 <a:effectLst/>
                 <a:latin typeface="Liberation Serif"/>
                 <a:ea typeface="NSimSun" panose="02010609030101010101" pitchFamily="49" charset="-122"/>
@@ -21778,7 +21780,7 @@
             <p:ph idx="1"/>
             <p:extLst>
               <p:ext uri="{D42A27DB-BD31-4B8C-83A1-F6EECF244321}">
-                <p14:modId xmlns:p14="http://schemas.microsoft.com/office/powerpoint/2010/main" val="2583326091"/>
+                <p14:modId xmlns:p14="http://schemas.microsoft.com/office/powerpoint/2010/main" val="2034247455"/>
               </p:ext>
             </p:extLst>
           </p:nvPr>
@@ -21928,7 +21930,7 @@
           <a:ln/>
           <a:extLst>
             <a:ext uri="{91240B29-F687-4f45-9708-019B960494DF}">
-              <a14:hiddenLine xmlns:a16="http://schemas.microsoft.com/office/drawing/2014/main" xmlns:a14="http://schemas.microsoft.com/office/drawing/2010/main" xmlns="" w="9525">
+              <a14:hiddenLine xmlns="" xmlns:a14="http://schemas.microsoft.com/office/drawing/2010/main" xmlns:a16="http://schemas.microsoft.com/office/drawing/2014/main" w="9525">
                 <a:solidFill>
                   <a:srgbClr val="000000"/>
                 </a:solidFill>
@@ -22147,7 +22149,7 @@
           <a:p>
             <a:pPr lvl="1"/>
             <a:r>
-              <a:rPr lang="en-US" dirty="0">
+              <a:rPr lang="en-US" sz="1800" dirty="0">
                 <a:effectLst/>
               </a:rPr>
               <a:t>Task Management</a:t>
@@ -22156,7 +22158,7 @@
           <a:p>
             <a:pPr lvl="1"/>
             <a:r>
-              <a:rPr lang="en-US" dirty="0">
+              <a:rPr lang="en-US" sz="1800" dirty="0">
                 <a:effectLst/>
               </a:rPr>
               <a:t>Task Organization</a:t>
@@ -22165,7 +22167,7 @@
           <a:p>
             <a:pPr lvl="1"/>
             <a:r>
-              <a:rPr lang="en-US" dirty="0">
+              <a:rPr lang="en-US" sz="1800" dirty="0">
                 <a:effectLst/>
               </a:rPr>
               <a:t>Due Dates and Reminders</a:t>
@@ -22174,38 +22176,38 @@
           <a:p>
             <a:pPr lvl="1"/>
             <a:r>
-              <a:rPr lang="en-US" dirty="0">
+              <a:rPr lang="en-US" sz="1800" dirty="0">
                 <a:effectLst/>
               </a:rPr>
               <a:t>Search and Filter</a:t>
             </a:r>
-            <a:endParaRPr lang="en-US" dirty="0"/>
+            <a:endParaRPr lang="en-US" sz="1800" dirty="0"/>
           </a:p>
           <a:p>
             <a:pPr lvl="1"/>
             <a:r>
-              <a:rPr lang="en-US" dirty="0"/>
+              <a:rPr lang="en-US" sz="1800" dirty="0"/>
               <a:t>Pomodoro Technique</a:t>
             </a:r>
           </a:p>
           <a:p>
             <a:pPr lvl="1"/>
             <a:r>
-              <a:rPr lang="en-US" dirty="0"/>
+              <a:rPr lang="en-US" sz="1800" dirty="0"/>
               <a:t>Progress Insights &amp; Analytics</a:t>
             </a:r>
           </a:p>
           <a:p>
             <a:pPr lvl="1"/>
             <a:r>
-              <a:rPr lang="en-US" dirty="0"/>
+              <a:rPr lang="en-US" sz="1800" dirty="0"/>
               <a:t>Calendar View</a:t>
             </a:r>
           </a:p>
           <a:p>
             <a:pPr lvl="1"/>
             <a:r>
-              <a:rPr lang="en-US" dirty="0"/>
+              <a:rPr lang="en-US" sz="1800" dirty="0"/>
               <a:t>Progress Tracking</a:t>
             </a:r>
           </a:p>
@@ -22216,7 +22218,9 @@
             </a:endParaRPr>
           </a:p>
           <a:p>
-            <a:pPr marL="0" indent="0"/>
+            <a:pPr marL="0" indent="0">
+              <a:buNone/>
+            </a:pPr>
             <a:endParaRPr lang="en-US" sz="1600" dirty="0">
               <a:effectLst/>
             </a:endParaRPr>
@@ -22944,8 +22948,8 @@
         </p:nvSpPr>
         <p:spPr>
           <a:xfrm>
-            <a:off x="641754" y="1687286"/>
-            <a:ext cx="3269463" cy="3978017"/>
+            <a:off x="182880" y="1687286"/>
+            <a:ext cx="3904488" cy="3978017"/>
           </a:xfrm>
         </p:spPr>
         <p:txBody>
@@ -22960,7 +22964,7 @@
               </a:spcBef>
             </a:pPr>
             <a:r>
-              <a:rPr lang="en-US" sz="3200" kern="1200" cap="all" dirty="0">
+              <a:rPr lang="en-US" sz="4000" kern="1200" cap="all" dirty="0">
                 <a:latin typeface="+mj-lt"/>
                 <a:ea typeface="+mj-ea"/>
                 <a:cs typeface="+mj-cs"/>
@@ -22986,7 +22990,7 @@
             <p:ph idx="1"/>
             <p:extLst>
               <p:ext uri="{D42A27DB-BD31-4B8C-83A1-F6EECF244321}">
-                <p14:modId xmlns:p14="http://schemas.microsoft.com/office/powerpoint/2010/main" val="362013367"/>
+                <p14:modId xmlns:p14="http://schemas.microsoft.com/office/powerpoint/2010/main" val="1704653182"/>
               </p:ext>
             </p:extLst>
           </p:nvPr>
@@ -23304,7 +23308,7 @@
               </a:spcBef>
             </a:pPr>
             <a:r>
-              <a:rPr lang="en-US" sz="3600" kern="1200" cap="all" dirty="0">
+              <a:rPr lang="en-US" sz="4400" kern="1200" cap="all" dirty="0">
                 <a:latin typeface="+mj-lt"/>
                 <a:ea typeface="+mj-ea"/>
                 <a:cs typeface="+mj-cs"/>
@@ -23369,7 +23373,7 @@
               </a:tabLst>
             </a:pPr>
             <a:r>
-              <a:rPr lang="en-US" kern="100" dirty="0">
+              <a:rPr lang="en-US" sz="2400" kern="100" dirty="0">
                 <a:latin typeface="Liberation Serif"/>
                 <a:ea typeface="NSimSun" panose="02010609030101010101" pitchFamily="49" charset="-122"/>
               </a:rPr>
@@ -23388,7 +23392,7 @@
               </a:tabLst>
             </a:pPr>
             <a:r>
-              <a:rPr lang="en-US" kern="100" dirty="0">
+              <a:rPr lang="en-US" sz="2400" kern="100" dirty="0">
                 <a:latin typeface="Liberation Serif"/>
                 <a:ea typeface="NSimSun" panose="02010609030101010101" pitchFamily="49" charset="-122"/>
               </a:rPr>
@@ -23407,7 +23411,7 @@
               </a:tabLst>
             </a:pPr>
             <a:r>
-              <a:rPr lang="en-US" kern="100" dirty="0">
+              <a:rPr lang="en-US" sz="2400" kern="100" dirty="0">
                 <a:latin typeface="Liberation Serif"/>
                 <a:ea typeface="NSimSun" panose="02010609030101010101" pitchFamily="49" charset="-122"/>
               </a:rPr>
@@ -23787,7 +23791,7 @@
               </a:tabLst>
             </a:pPr>
             <a:r>
-              <a:rPr lang="en-US" kern="100" dirty="0">
+              <a:rPr lang="en-US" sz="2400" kern="100" dirty="0">
                 <a:latin typeface="Liberation Serif"/>
                 <a:ea typeface="NSimSun" panose="02010609030101010101" pitchFamily="49" charset="-122"/>
               </a:rPr>
@@ -23806,7 +23810,7 @@
               </a:tabLst>
             </a:pPr>
             <a:r>
-              <a:rPr lang="en-US" kern="100" dirty="0">
+              <a:rPr lang="en-US" sz="2400" kern="100" dirty="0">
                 <a:latin typeface="Liberation Serif"/>
                 <a:ea typeface="NSimSun" panose="02010609030101010101" pitchFamily="49" charset="-122"/>
               </a:rPr>
@@ -23825,7 +23829,7 @@
               </a:tabLst>
             </a:pPr>
             <a:r>
-              <a:rPr lang="en-US" kern="100" dirty="0">
+              <a:rPr lang="en-US" sz="2400" kern="100" dirty="0">
                 <a:latin typeface="Liberation Serif"/>
                 <a:ea typeface="NSimSun" panose="02010609030101010101" pitchFamily="49" charset="-122"/>
               </a:rPr>
@@ -23902,7 +23906,7 @@
         </p:blipFill>
         <p:spPr>
           <a:xfrm>
-            <a:off x="20" y="10"/>
+            <a:off x="0" y="11"/>
             <a:ext cx="12191980" cy="6857989"/>
           </a:xfrm>
           <a:prstGeom prst="rect">
@@ -24143,12 +24147,27 @@
               </a:spcBef>
             </a:pPr>
             <a:r>
-              <a:rPr lang="en-US" sz="3600" kern="1200" cap="all" dirty="0">
+              <a:rPr lang="en-US" sz="4400" kern="1200" cap="all" dirty="0">
                 <a:latin typeface="+mj-lt"/>
                 <a:ea typeface="+mj-ea"/>
                 <a:cs typeface="+mj-cs"/>
               </a:rPr>
-              <a:t>Search and Filter</a:t>
+              <a:t>Search </a:t>
+            </a:r>
+            <a:br>
+              <a:rPr lang="en-US" sz="4400" kern="1200" cap="all" dirty="0">
+                <a:latin typeface="+mj-lt"/>
+                <a:ea typeface="+mj-ea"/>
+                <a:cs typeface="+mj-cs"/>
+              </a:rPr>
+            </a:br>
+            <a:r>
+              <a:rPr lang="en-US" sz="4400" kern="1200" cap="all" dirty="0">
+                <a:latin typeface="+mj-lt"/>
+                <a:ea typeface="+mj-ea"/>
+                <a:cs typeface="+mj-cs"/>
+              </a:rPr>
+              <a:t>and Filter</a:t>
             </a:r>
           </a:p>
         </p:txBody>
@@ -24207,7 +24226,7 @@
               </a:tabLst>
             </a:pPr>
             <a:r>
-              <a:rPr lang="en-US" kern="100" dirty="0">
+              <a:rPr lang="en-US" sz="2400" kern="100" dirty="0">
                 <a:latin typeface="Liberation Serif"/>
                 <a:ea typeface="NSimSun" panose="02010609030101010101" pitchFamily="49" charset="-122"/>
               </a:rPr>
@@ -24226,7 +24245,7 @@
               </a:tabLst>
             </a:pPr>
             <a:r>
-              <a:rPr lang="en-US" kern="100" dirty="0">
+              <a:rPr lang="en-US" sz="2400" kern="100" dirty="0">
                 <a:latin typeface="Liberation Serif"/>
                 <a:ea typeface="NSimSun" panose="02010609030101010101" pitchFamily="49" charset="-122"/>
               </a:rPr>
@@ -24541,12 +24560,12 @@
               </a:spcBef>
             </a:pPr>
             <a:r>
-              <a:rPr lang="en-US" sz="4400" kern="1200" cap="all" dirty="0">
+              <a:rPr lang="en-US" sz="4800" kern="1200" cap="all" dirty="0">
                 <a:latin typeface="+mj-lt"/>
                 <a:ea typeface="+mj-ea"/>
                 <a:cs typeface="+mj-cs"/>
               </a:rPr>
-              <a:t>Pomodoro Technique</a:t>
+              <a:t>Study Techniques</a:t>
             </a:r>
           </a:p>
         </p:txBody>
@@ -24579,120 +24598,23 @@
           </a:bodyPr>
           <a:lstStyle/>
           <a:p>
-            <a:pPr marL="743300" indent="-457200">
+            <a:pPr marL="629000">
               <a:spcAft>
                 <a:spcPts val="700"/>
               </a:spcAft>
-              <a:buFont typeface="+mj-lt"/>
-              <a:buAutoNum type="arabicParenR"/>
+              <a:buFont typeface="Arial" panose="020B0604020202020204" pitchFamily="34" charset="0"/>
+              <a:buChar char="•"/>
               <a:tabLst>
                 <a:tab pos="900430" algn="l"/>
               </a:tabLst>
             </a:pPr>
             <a:r>
-              <a:rPr lang="en-US" kern="100" dirty="0">
-                <a:latin typeface="Liberation Serif"/>
-                <a:ea typeface="NSimSun" panose="02010609030101010101" pitchFamily="49" charset="-122"/>
-              </a:rPr>
-              <a:t>Choose your topic.</a:t>
+              <a:rPr lang="en-US" sz="2000" dirty="0"/>
+              <a:t>Offers a variety of study techniques tailored to boost focus and productivity, including the Pomodoro Technique and more</a:t>
             </a:r>
-          </a:p>
-          <a:p>
-            <a:pPr marL="743300" indent="-457200">
-              <a:spcAft>
-                <a:spcPts val="700"/>
-              </a:spcAft>
-              <a:buFont typeface="+mj-lt"/>
-              <a:buAutoNum type="arabicParenR"/>
-              <a:tabLst>
-                <a:tab pos="900430" algn="l"/>
-              </a:tabLst>
-            </a:pPr>
-            <a:r>
-              <a:rPr lang="en-US" kern="100" dirty="0">
-                <a:latin typeface="Liberation Serif"/>
-                <a:ea typeface="NSimSun" panose="02010609030101010101" pitchFamily="49" charset="-122"/>
-              </a:rPr>
-              <a:t>Set a timer for 25 minutes.</a:t>
-            </a:r>
-          </a:p>
-          <a:p>
-            <a:pPr marL="743300" indent="-457200">
-              <a:spcAft>
-                <a:spcPts val="700"/>
-              </a:spcAft>
-              <a:buFont typeface="+mj-lt"/>
-              <a:buAutoNum type="arabicParenR"/>
-              <a:tabLst>
-                <a:tab pos="900430" algn="l"/>
-              </a:tabLst>
-            </a:pPr>
-            <a:r>
-              <a:rPr lang="en-US" kern="100" dirty="0">
-                <a:latin typeface="Liberation Serif"/>
-                <a:ea typeface="NSimSun" panose="02010609030101010101" pitchFamily="49" charset="-122"/>
-              </a:rPr>
-              <a:t>Work on the topic until the timer goes off.</a:t>
-            </a:r>
-          </a:p>
-          <a:p>
-            <a:pPr marL="743300" indent="-457200">
-              <a:spcAft>
-                <a:spcPts val="700"/>
-              </a:spcAft>
-              <a:buFont typeface="+mj-lt"/>
-              <a:buAutoNum type="arabicParenR"/>
-              <a:tabLst>
-                <a:tab pos="900430" algn="l"/>
-              </a:tabLst>
-            </a:pPr>
-            <a:r>
-              <a:rPr lang="en-US" kern="100" dirty="0">
-                <a:latin typeface="Liberation Serif"/>
-                <a:ea typeface="NSimSun" panose="02010609030101010101" pitchFamily="49" charset="-122"/>
-              </a:rPr>
-              <a:t>Take a short break (usually 5 minutes).</a:t>
-            </a:r>
-          </a:p>
-          <a:p>
-            <a:pPr marL="743300" indent="-457200">
-              <a:spcAft>
-                <a:spcPts val="700"/>
-              </a:spcAft>
-              <a:buFont typeface="+mj-lt"/>
-              <a:buAutoNum type="arabicParenR"/>
-              <a:tabLst>
-                <a:tab pos="900430" algn="l"/>
-              </a:tabLst>
-            </a:pPr>
-            <a:r>
-              <a:rPr lang="en-US" kern="100" dirty="0">
-                <a:latin typeface="Liberation Serif"/>
-                <a:ea typeface="NSimSun" panose="02010609030101010101" pitchFamily="49" charset="-122"/>
-              </a:rPr>
-              <a:t>After every fourth Pomodoro, take a longer</a:t>
-            </a:r>
-          </a:p>
-          <a:p>
-            <a:pPr marL="286100" indent="0">
-              <a:spcAft>
-                <a:spcPts val="700"/>
-              </a:spcAft>
-              <a:buNone/>
-              <a:tabLst>
-                <a:tab pos="900430" algn="l"/>
-              </a:tabLst>
-            </a:pPr>
-            <a:r>
-              <a:rPr lang="en-US" kern="100" dirty="0">
-                <a:latin typeface="Liberation Serif"/>
-                <a:ea typeface="NSimSun" panose="02010609030101010101" pitchFamily="49" charset="-122"/>
-              </a:rPr>
-              <a:t>       break (usually 15-30 minutes).</a:t>
-            </a:r>
-          </a:p>
-          <a:p>
-            <a:endParaRPr lang="en-US" dirty="0"/>
+            <a:endParaRPr lang="en-US" sz="2000" kern="100" dirty="0">
+              <a:ea typeface="NSimSun" panose="02010609030101010101" pitchFamily="49" charset="-122"/>
+            </a:endParaRPr>
           </a:p>
         </p:txBody>
       </p:sp>

</xml_diff>

<commit_message>
HCI Project Presentation - Final Touches
</commit_message>
<xml_diff>
--- a/Documents/HCI Project Proposal.pptx
+++ b/Documents/HCI Project Proposal.pptx
@@ -3704,12 +3704,12 @@
             <a:defRPr cap="all"/>
           </a:pPr>
           <a:r>
-            <a:rPr lang="en-US" b="1"/>
+            <a:rPr lang="en-US" b="1" dirty="0"/>
             <a:t>If it's simple</a:t>
           </a:r>
           <a:r>
-            <a:rPr lang="en-US"/>
-            <a:t>: Using JSON or INI files to store settings and task data is sufficient.</a:t>
+            <a:rPr lang="en-US" dirty="0"/>
+            <a:t>: Using JSON files to store settings and task data is sufficient.</a:t>
           </a:r>
         </a:p>
       </dgm:t>
@@ -5501,12 +5501,12 @@
             <a:defRPr cap="all"/>
           </a:pPr>
           <a:r>
-            <a:rPr lang="en-US" sz="1500" b="1" kern="1200"/>
+            <a:rPr lang="en-US" sz="1500" b="1" kern="1200" dirty="0"/>
             <a:t>If it's simple</a:t>
           </a:r>
           <a:r>
-            <a:rPr lang="en-US" sz="1500" kern="1200"/>
-            <a:t>: Using JSON or INI files to store settings and task data is sufficient.</a:t>
+            <a:rPr lang="en-US" sz="1500" kern="1200" dirty="0"/>
+            <a:t>: Using JSON files to store settings and task data is sufficient.</a:t>
           </a:r>
         </a:p>
       </dsp:txBody>
@@ -13485,7 +13485,7 @@
           <a:effectLst/>
           <a:extLst>
             <a:ext uri="{91240B29-F687-4f45-9708-019B960494DF}">
-              <a14:hiddenLine xmlns:a14="http://schemas.microsoft.com/office/drawing/2010/main" xmlns="" w="9525">
+              <a14:hiddenLine xmlns="" xmlns:a14="http://schemas.microsoft.com/office/drawing/2010/main" w="9525">
                 <a:solidFill>
                   <a:srgbClr val="000000"/>
                 </a:solidFill>
@@ -15007,7 +15007,7 @@
           <a:ln/>
           <a:extLst>
             <a:ext uri="{91240B29-F687-4f45-9708-019B960494DF}">
-              <a14:hiddenLine xmlns:a14="http://schemas.microsoft.com/office/drawing/2010/main" xmlns="" w="9525">
+              <a14:hiddenLine xmlns="" xmlns:a14="http://schemas.microsoft.com/office/drawing/2010/main" w="9525">
                 <a:solidFill>
                   <a:srgbClr val="000000"/>
                 </a:solidFill>
@@ -15282,7 +15282,7 @@
           <a:ln/>
           <a:extLst>
             <a:ext uri="{91240B29-F687-4f45-9708-019B960494DF}">
-              <a14:hiddenLine xmlns:a14="http://schemas.microsoft.com/office/drawing/2010/main" xmlns="" w="9525">
+              <a14:hiddenLine xmlns="" xmlns:a14="http://schemas.microsoft.com/office/drawing/2010/main" w="9525">
                 <a:solidFill>
                   <a:srgbClr val="000000"/>
                 </a:solidFill>
@@ -15565,7 +15565,7 @@
           <a:ln/>
           <a:extLst>
             <a:ext uri="{91240B29-F687-4f45-9708-019B960494DF}">
-              <a14:hiddenLine xmlns:a14="http://schemas.microsoft.com/office/drawing/2010/main" xmlns="" w="9525">
+              <a14:hiddenLine xmlns="" xmlns:a14="http://schemas.microsoft.com/office/drawing/2010/main" w="9525">
                 <a:solidFill>
                   <a:srgbClr val="000000"/>
                 </a:solidFill>
@@ -16191,7 +16191,7 @@
           <a:ln/>
           <a:extLst>
             <a:ext uri="{91240B29-F687-4f45-9708-019B960494DF}">
-              <a14:hiddenLine xmlns:a14="http://schemas.microsoft.com/office/drawing/2010/main" xmlns="" w="9525">
+              <a14:hiddenLine xmlns="" xmlns:a14="http://schemas.microsoft.com/office/drawing/2010/main" w="9525">
                 <a:solidFill>
                   <a:srgbClr val="000000"/>
                 </a:solidFill>
@@ -16530,7 +16530,7 @@
           <a:ln/>
           <a:extLst>
             <a:ext uri="{91240B29-F687-4f45-9708-019B960494DF}">
-              <a14:hiddenLine xmlns:a14="http://schemas.microsoft.com/office/drawing/2010/main" xmlns="" w="9525">
+              <a14:hiddenLine xmlns="" xmlns:a14="http://schemas.microsoft.com/office/drawing/2010/main" w="9525">
                 <a:solidFill>
                   <a:srgbClr val="000000"/>
                 </a:solidFill>
@@ -17007,7 +17007,7 @@
           <a:ln/>
           <a:extLst>
             <a:ext uri="{91240B29-F687-4f45-9708-019B960494DF}">
-              <a14:hiddenLine xmlns:a14="http://schemas.microsoft.com/office/drawing/2010/main" xmlns="" w="9525">
+              <a14:hiddenLine xmlns="" xmlns:a14="http://schemas.microsoft.com/office/drawing/2010/main" w="9525">
                 <a:solidFill>
                   <a:srgbClr val="000000"/>
                 </a:solidFill>
@@ -17436,7 +17436,7 @@
           <a:ln/>
           <a:extLst>
             <a:ext uri="{91240B29-F687-4f45-9708-019B960494DF}">
-              <a14:hiddenLine xmlns:a14="http://schemas.microsoft.com/office/drawing/2010/main" xmlns="" w="9525">
+              <a14:hiddenLine xmlns="" xmlns:a14="http://schemas.microsoft.com/office/drawing/2010/main" w="9525">
                 <a:solidFill>
                   <a:srgbClr val="000000"/>
                 </a:solidFill>
@@ -18863,7 +18863,7 @@
             </a:r>
             <a:r>
               <a:rPr lang="en-US" dirty="0"/>
-              <a:t>[insert name here] - [insert ID here]</a:t>
+              <a:t>Badr Elsayed - 22010664</a:t>
             </a:r>
           </a:p>
           <a:p>
@@ -18890,8 +18890,12 @@
               <a:buChar char="•"/>
             </a:pPr>
             <a:r>
+              <a:rPr lang="en-US" dirty="0" err="1"/>
+              <a:t>Adham</a:t>
+            </a:r>
+            <a:r>
               <a:rPr lang="en-US" dirty="0"/>
-              <a:t>[insert name here] - [insert ID here]</a:t>
+              <a:t> Anas- 22010601</a:t>
             </a:r>
           </a:p>
           <a:p>
@@ -18930,13 +18934,8 @@
             </a:pPr>
             <a:r>
               <a:rPr lang="en-US" dirty="0"/>
-              <a:t>Ali El-Deen Maher </a:t>
+              <a:t>Ali El-Deen Maher - 22010934</a:t>
             </a:r>
-            <a:r>
-              <a:rPr lang="en-US"/>
-              <a:t>- 22010934</a:t>
-            </a:r>
-            <a:endParaRPr lang="en-US" dirty="0"/>
           </a:p>
           <a:p>
             <a:pPr marL="285750" indent="-285750">
@@ -18948,7 +18947,7 @@
             </a:pPr>
             <a:r>
               <a:rPr lang="en-US" dirty="0"/>
-              <a:t>[insert name here] - [insert ID here]</a:t>
+              <a:t>Yousef Awad - 22011390</a:t>
             </a:r>
           </a:p>
         </p:txBody>
@@ -20717,7 +20716,7 @@
           <a:effectLst/>
           <a:extLst>
             <a:ext uri="{91240B29-F687-4f45-9708-019B960494DF}">
-              <a14:hiddenLine xmlns="" xmlns:a16="http://schemas.microsoft.com/office/drawing/2014/main" xmlns:p14="http://schemas.microsoft.com/office/powerpoint/2010/main" xmlns:a14="http://schemas.microsoft.com/office/drawing/2010/main" w="9525">
+              <a14:hiddenLine xmlns:a14="http://schemas.microsoft.com/office/drawing/2010/main" xmlns:p14="http://schemas.microsoft.com/office/powerpoint/2010/main" xmlns:a16="http://schemas.microsoft.com/office/drawing/2014/main" xmlns="" w="9525">
                 <a:solidFill>
                   <a:srgbClr val="000000"/>
                 </a:solidFill>
@@ -21821,7 +21820,7 @@
             <p:ph idx="1"/>
             <p:extLst>
               <p:ext uri="{D42A27DB-BD31-4B8C-83A1-F6EECF244321}">
-                <p14:modId xmlns:p14="http://schemas.microsoft.com/office/powerpoint/2010/main" val="2034247455"/>
+                <p14:modId xmlns:p14="http://schemas.microsoft.com/office/powerpoint/2010/main" val="2583477044"/>
               </p:ext>
             </p:extLst>
           </p:nvPr>
@@ -21971,7 +21970,7 @@
           <a:ln/>
           <a:extLst>
             <a:ext uri="{91240B29-F687-4f45-9708-019B960494DF}">
-              <a14:hiddenLine xmlns="" xmlns:a14="http://schemas.microsoft.com/office/drawing/2010/main" xmlns:a16="http://schemas.microsoft.com/office/drawing/2014/main" w="9525">
+              <a14:hiddenLine xmlns:a16="http://schemas.microsoft.com/office/drawing/2014/main" xmlns:a14="http://schemas.microsoft.com/office/drawing/2010/main" xmlns="" w="9525">
                 <a:solidFill>
                   <a:srgbClr val="000000"/>
                 </a:solidFill>

</xml_diff>